<commit_message>
Implement Replicate Image generation code
</commit_message>
<xml_diff>
--- a/Documentation/AI and ChatGPT.pptx
+++ b/Documentation/AI and ChatGPT.pptx
@@ -241,7 +241,7 @@
           <a:p>
             <a:fld id="{70B60CFD-5DCB-4285-80B2-FB614FDA26CE}" type="datetimeFigureOut">
               <a:rPr lang="en-AU" smtClean="0"/>
-              <a:t>13/05/2023</a:t>
+              <a:t>28/09/2023</a:t>
             </a:fld>
             <a:endParaRPr lang="en-AU"/>
           </a:p>
@@ -1165,7 +1165,7 @@
           <a:p>
             <a:fld id="{18DC9284-3259-4668-9DB1-17E5134515F4}" type="datetimeFigureOut">
               <a:rPr lang="en-AU" smtClean="0"/>
-              <a:t>13/05/2023</a:t>
+              <a:t>28/09/2023</a:t>
             </a:fld>
             <a:endParaRPr lang="en-AU"/>
           </a:p>
@@ -1365,7 +1365,7 @@
           <a:p>
             <a:fld id="{18DC9284-3259-4668-9DB1-17E5134515F4}" type="datetimeFigureOut">
               <a:rPr lang="en-AU" smtClean="0"/>
-              <a:t>13/05/2023</a:t>
+              <a:t>28/09/2023</a:t>
             </a:fld>
             <a:endParaRPr lang="en-AU"/>
           </a:p>
@@ -1575,7 +1575,7 @@
           <a:p>
             <a:fld id="{18DC9284-3259-4668-9DB1-17E5134515F4}" type="datetimeFigureOut">
               <a:rPr lang="en-AU" smtClean="0"/>
-              <a:t>13/05/2023</a:t>
+              <a:t>28/09/2023</a:t>
             </a:fld>
             <a:endParaRPr lang="en-AU"/>
           </a:p>
@@ -1834,7 +1834,7 @@
           <a:p>
             <a:fld id="{18DC9284-3259-4668-9DB1-17E5134515F4}" type="datetimeFigureOut">
               <a:rPr lang="en-AU" smtClean="0"/>
-              <a:t>13/05/2023</a:t>
+              <a:t>28/09/2023</a:t>
             </a:fld>
             <a:endParaRPr lang="en-AU"/>
           </a:p>
@@ -2110,7 +2110,7 @@
           <a:p>
             <a:fld id="{18DC9284-3259-4668-9DB1-17E5134515F4}" type="datetimeFigureOut">
               <a:rPr lang="en-AU" smtClean="0"/>
-              <a:t>13/05/2023</a:t>
+              <a:t>28/09/2023</a:t>
             </a:fld>
             <a:endParaRPr lang="en-AU"/>
           </a:p>
@@ -2378,7 +2378,7 @@
           <a:p>
             <a:fld id="{18DC9284-3259-4668-9DB1-17E5134515F4}" type="datetimeFigureOut">
               <a:rPr lang="en-AU" smtClean="0"/>
-              <a:t>13/05/2023</a:t>
+              <a:t>28/09/2023</a:t>
             </a:fld>
             <a:endParaRPr lang="en-AU"/>
           </a:p>
@@ -2793,7 +2793,7 @@
           <a:p>
             <a:fld id="{18DC9284-3259-4668-9DB1-17E5134515F4}" type="datetimeFigureOut">
               <a:rPr lang="en-AU" smtClean="0"/>
-              <a:t>13/05/2023</a:t>
+              <a:t>28/09/2023</a:t>
             </a:fld>
             <a:endParaRPr lang="en-AU"/>
           </a:p>
@@ -2935,7 +2935,7 @@
           <a:p>
             <a:fld id="{18DC9284-3259-4668-9DB1-17E5134515F4}" type="datetimeFigureOut">
               <a:rPr lang="en-AU" smtClean="0"/>
-              <a:t>13/05/2023</a:t>
+              <a:t>28/09/2023</a:t>
             </a:fld>
             <a:endParaRPr lang="en-AU"/>
           </a:p>
@@ -3048,7 +3048,7 @@
           <a:p>
             <a:fld id="{18DC9284-3259-4668-9DB1-17E5134515F4}" type="datetimeFigureOut">
               <a:rPr lang="en-AU" smtClean="0"/>
-              <a:t>13/05/2023</a:t>
+              <a:t>28/09/2023</a:t>
             </a:fld>
             <a:endParaRPr lang="en-AU"/>
           </a:p>
@@ -3361,7 +3361,7 @@
           <a:p>
             <a:fld id="{18DC9284-3259-4668-9DB1-17E5134515F4}" type="datetimeFigureOut">
               <a:rPr lang="en-AU" smtClean="0"/>
-              <a:t>13/05/2023</a:t>
+              <a:t>28/09/2023</a:t>
             </a:fld>
             <a:endParaRPr lang="en-AU"/>
           </a:p>
@@ -3650,7 +3650,7 @@
           <a:p>
             <a:fld id="{18DC9284-3259-4668-9DB1-17E5134515F4}" type="datetimeFigureOut">
               <a:rPr lang="en-AU" smtClean="0"/>
-              <a:t>13/05/2023</a:t>
+              <a:t>28/09/2023</a:t>
             </a:fld>
             <a:endParaRPr lang="en-AU"/>
           </a:p>
@@ -3893,7 +3893,7 @@
           <a:p>
             <a:fld id="{18DC9284-3259-4668-9DB1-17E5134515F4}" type="datetimeFigureOut">
               <a:rPr lang="en-AU" smtClean="0"/>
-              <a:t>13/05/2023</a:t>
+              <a:t>28/09/2023</a:t>
             </a:fld>
             <a:endParaRPr lang="en-AU"/>
           </a:p>
@@ -5082,6 +5082,140 @@
           <a:p>
             <a:pPr lvl="1"/>
             <a:r>
+              <a:rPr lang="en-AU" sz="2200" dirty="0">
+                <a:highlight>
+                  <a:srgbClr val="FFFF00"/>
+                </a:highlight>
+              </a:rPr>
+              <a:t>OpenAI Whisper, Microsoft</a:t>
+            </a:r>
+            <a:r>
+              <a:rPr lang="en-AU" sz="2200" dirty="0"/>
+              <a:t>, Amazon, </a:t>
+            </a:r>
+            <a:r>
+              <a:rPr lang="en-AU" sz="2200" dirty="0">
+                <a:highlight>
+                  <a:srgbClr val="FFFF00"/>
+                </a:highlight>
+              </a:rPr>
+              <a:t>Google, </a:t>
+            </a:r>
+            <a:r>
+              <a:rPr lang="en-AU" sz="2200" dirty="0" err="1">
+                <a:highlight>
+                  <a:srgbClr val="FFFF00"/>
+                </a:highlight>
+              </a:rPr>
+              <a:t>DeepGram</a:t>
+            </a:r>
+            <a:r>
+              <a:rPr lang="en-AU" sz="2200" dirty="0">
+                <a:highlight>
+                  <a:srgbClr val="FFFF00"/>
+                </a:highlight>
+              </a:rPr>
+              <a:t>, Assembly.AI</a:t>
+            </a:r>
+          </a:p>
+          <a:p>
+            <a:r>
+              <a:rPr lang="en-AU" sz="2600" dirty="0"/>
+              <a:t>Text to Speech – </a:t>
+            </a:r>
+          </a:p>
+          <a:p>
+            <a:pPr lvl="1"/>
+            <a:r>
+              <a:rPr lang="en-AU" sz="2200" dirty="0">
+                <a:highlight>
+                  <a:srgbClr val="FFFF00"/>
+                </a:highlight>
+              </a:rPr>
+              <a:t>Eleven Labs, Microsoft, Amazon Polly, Google, Windows SAPI</a:t>
+            </a:r>
+          </a:p>
+          <a:p>
+            <a:r>
+              <a:rPr lang="en-AU" sz="2600" dirty="0"/>
+              <a:t>Face Recognition – </a:t>
+            </a:r>
+          </a:p>
+          <a:p>
+            <a:pPr lvl="1"/>
+            <a:r>
+              <a:rPr lang="en-AU" sz="2200" dirty="0">
+                <a:highlight>
+                  <a:srgbClr val="FFFF00"/>
+                </a:highlight>
+              </a:rPr>
+              <a:t>Microsoft</a:t>
+            </a:r>
+            <a:r>
+              <a:rPr lang="en-AU" sz="2200" dirty="0"/>
+              <a:t>, Amazon, </a:t>
+            </a:r>
+            <a:r>
+              <a:rPr lang="en-AU" sz="2200" dirty="0">
+                <a:highlight>
+                  <a:srgbClr val="FFFF00"/>
+                </a:highlight>
+              </a:rPr>
+              <a:t>Google</a:t>
+            </a:r>
+            <a:r>
+              <a:rPr lang="en-AU" sz="2200" dirty="0"/>
+              <a:t>, </a:t>
+            </a:r>
+            <a:r>
+              <a:rPr lang="en-AU" sz="2200" dirty="0" err="1"/>
+              <a:t>OpenCV</a:t>
+            </a:r>
+            <a:r>
+              <a:rPr lang="en-AU" sz="2200" dirty="0"/>
+              <a:t>, </a:t>
+            </a:r>
+            <a:r>
+              <a:rPr lang="en-AU" sz="2200" dirty="0" err="1">
+                <a:highlight>
+                  <a:srgbClr val="FFFF00"/>
+                </a:highlight>
+              </a:rPr>
+              <a:t>TensorFlow</a:t>
+            </a:r>
+            <a:endParaRPr lang="en-AU" sz="2200" dirty="0">
+              <a:highlight>
+                <a:srgbClr val="FFFF00"/>
+              </a:highlight>
+            </a:endParaRPr>
+          </a:p>
+          <a:p>
+            <a:r>
+              <a:rPr lang="en-AU" sz="2600" dirty="0"/>
+              <a:t>Object Recognition – </a:t>
+            </a:r>
+          </a:p>
+          <a:p>
+            <a:pPr lvl="1"/>
+            <a:r>
+              <a:rPr lang="en-AU" sz="2200" dirty="0"/>
+              <a:t>Microsoft, Amazon, Google, </a:t>
+            </a:r>
+            <a:r>
+              <a:rPr lang="en-AU" sz="2200" dirty="0" err="1"/>
+              <a:t>OpenCV</a:t>
+            </a:r>
+            <a:endParaRPr lang="en-AU" sz="2200" dirty="0"/>
+          </a:p>
+          <a:p>
+            <a:r>
+              <a:rPr lang="en-AU" sz="2600" dirty="0"/>
+              <a:t>Image Generation – </a:t>
+            </a:r>
+          </a:p>
+          <a:p>
+            <a:pPr lvl="1"/>
+            <a:r>
               <a:rPr lang="en-AU" sz="2200" dirty="0" err="1">
                 <a:highlight>
                   <a:srgbClr val="FFFF00"/>
@@ -5095,11 +5229,60 @@
                   <a:srgbClr val="FFFF00"/>
                 </a:highlight>
               </a:rPr>
-              <a:t> Whisper, Microsoft</a:t>
+              <a:t> DALL-E 2</a:t>
             </a:r>
             <a:r>
               <a:rPr lang="en-AU" sz="2200" dirty="0"/>
-              <a:t>, Amazon, </a:t>
+              <a:t>, </a:t>
+            </a:r>
+            <a:r>
+              <a:rPr lang="en-AU" sz="2200" dirty="0" err="1"/>
+              <a:t>Midjourney</a:t>
+            </a:r>
+            <a:r>
+              <a:rPr lang="en-AU" sz="2200" dirty="0"/>
+              <a:t>, </a:t>
+            </a:r>
+            <a:r>
+              <a:rPr lang="en-AU" sz="2200" dirty="0">
+                <a:highlight>
+                  <a:srgbClr val="FFFF00"/>
+                </a:highlight>
+              </a:rPr>
+              <a:t>Stable Diffusion</a:t>
+            </a:r>
+          </a:p>
+          <a:p>
+            <a:r>
+              <a:rPr lang="en-AU" sz="2600" dirty="0"/>
+              <a:t>Language Translation – </a:t>
+            </a:r>
+          </a:p>
+          <a:p>
+            <a:pPr lvl="1"/>
+            <a:r>
+              <a:rPr lang="en-AU" sz="2200" dirty="0">
+                <a:highlight>
+                  <a:srgbClr val="FFFF00"/>
+                </a:highlight>
+              </a:rPr>
+              <a:t>Microsoft</a:t>
+            </a:r>
+            <a:r>
+              <a:rPr lang="en-AU" sz="2200" dirty="0"/>
+              <a:t>, </a:t>
+            </a:r>
+            <a:r>
+              <a:rPr lang="en-AU" sz="2200" dirty="0">
+                <a:highlight>
+                  <a:srgbClr val="FFFF00"/>
+                </a:highlight>
+              </a:rPr>
+              <a:t>Amazon</a:t>
+            </a:r>
+            <a:r>
+              <a:rPr lang="en-AU" sz="2200" dirty="0"/>
+              <a:t>, </a:t>
             </a:r>
             <a:r>
               <a:rPr lang="en-AU" sz="2200" dirty="0">
@@ -5109,100 +5292,24 @@
               </a:rPr>
               <a:t>Google</a:t>
             </a:r>
-          </a:p>
-          <a:p>
-            <a:r>
-              <a:rPr lang="en-AU" sz="2600" dirty="0"/>
-              <a:t>Text to Speech – </a:t>
-            </a:r>
-          </a:p>
-          <a:p>
-            <a:pPr lvl="1"/>
-            <a:r>
-              <a:rPr lang="en-AU" sz="2200" dirty="0">
-                <a:highlight>
-                  <a:srgbClr val="FFFF00"/>
-                </a:highlight>
-              </a:rPr>
-              <a:t>Eleven Labs, Microsoft, Amazon Polly, Google, Windows SAPI</a:t>
-            </a:r>
-          </a:p>
-          <a:p>
-            <a:r>
-              <a:rPr lang="en-AU" sz="2600" dirty="0"/>
-              <a:t>Face Recognition – </a:t>
-            </a:r>
-          </a:p>
-          <a:p>
-            <a:pPr lvl="1"/>
-            <a:r>
-              <a:rPr lang="en-AU" sz="2200" dirty="0">
-                <a:highlight>
-                  <a:srgbClr val="FFFF00"/>
-                </a:highlight>
-              </a:rPr>
-              <a:t>Microsoft</a:t>
-            </a:r>
-            <a:r>
-              <a:rPr lang="en-AU" sz="2200" dirty="0"/>
-              <a:t>, Amazon, </a:t>
-            </a:r>
-            <a:r>
-              <a:rPr lang="en-AU" sz="2200" dirty="0">
-                <a:highlight>
-                  <a:srgbClr val="FFFF00"/>
-                </a:highlight>
-              </a:rPr>
-              <a:t>Google</a:t>
-            </a:r>
             <a:r>
               <a:rPr lang="en-AU" sz="2200" dirty="0"/>
               <a:t>, </a:t>
             </a:r>
             <a:r>
               <a:rPr lang="en-AU" sz="2200" dirty="0" err="1"/>
-              <a:t>OpenCV</a:t>
-            </a:r>
-            <a:r>
-              <a:rPr lang="en-AU" sz="2200" dirty="0"/>
-              <a:t>, </a:t>
-            </a:r>
-            <a:r>
-              <a:rPr lang="en-AU" sz="2200" dirty="0" err="1">
-                <a:highlight>
-                  <a:srgbClr val="FFFF00"/>
-                </a:highlight>
-              </a:rPr>
-              <a:t>TensorFlow</a:t>
-            </a:r>
-            <a:endParaRPr lang="en-AU" sz="2200" dirty="0">
-              <a:highlight>
-                <a:srgbClr val="FFFF00"/>
-              </a:highlight>
-            </a:endParaRPr>
-          </a:p>
-          <a:p>
+              <a:t>etc</a:t>
+            </a:r>
+            <a:endParaRPr lang="en-AU" sz="2200" dirty="0"/>
+          </a:p>
+          <a:p>
+            <a:r>
+              <a:rPr lang="en-AU" sz="2600" dirty="0" err="1"/>
+              <a:t>Chatbot</a:t>
+            </a:r>
             <a:r>
               <a:rPr lang="en-AU" sz="2600" dirty="0"/>
-              <a:t>Object Recognition – </a:t>
-            </a:r>
-          </a:p>
-          <a:p>
-            <a:pPr lvl="1"/>
-            <a:r>
-              <a:rPr lang="en-AU" sz="2200" dirty="0"/>
-              <a:t>Microsoft, Amazon, Google, </a:t>
-            </a:r>
-            <a:r>
-              <a:rPr lang="en-AU" sz="2200" dirty="0" err="1"/>
-              <a:t>OpenCV</a:t>
-            </a:r>
-            <a:endParaRPr lang="en-AU" sz="2200" dirty="0"/>
-          </a:p>
-          <a:p>
-            <a:r>
-              <a:rPr lang="en-AU" sz="2600" dirty="0"/>
-              <a:t>Image Generation – </a:t>
+              <a:t> / Language Model – </a:t>
             </a:r>
           </a:p>
           <a:p>
@@ -5221,83 +5328,28 @@
                   <a:srgbClr val="FFFF00"/>
                 </a:highlight>
               </a:rPr>
-              <a:t> DALL-E 2</a:t>
+              <a:t> GPT3/3.5</a:t>
             </a:r>
             <a:r>
               <a:rPr lang="en-AU" sz="2200" dirty="0"/>
-              <a:t>, </a:t>
-            </a:r>
-            <a:r>
-              <a:rPr lang="en-AU" sz="2200" dirty="0" err="1"/>
-              <a:t>Midjourney</a:t>
-            </a:r>
-            <a:r>
-              <a:rPr lang="en-AU" sz="2200" dirty="0"/>
-              <a:t>, Stable Diffusion</a:t>
-            </a:r>
-          </a:p>
-          <a:p>
-            <a:r>
-              <a:rPr lang="en-AU" sz="2600" dirty="0"/>
-              <a:t>Language Translation – </a:t>
-            </a:r>
-          </a:p>
-          <a:p>
-            <a:pPr lvl="1"/>
+              <a:t>/4/</a:t>
+            </a:r>
+            <a:r>
+              <a:rPr lang="en-AU" sz="2200" dirty="0" err="1">
+                <a:highlight>
+                  <a:srgbClr val="FFFF00"/>
+                </a:highlight>
+              </a:rPr>
+              <a:t>ChatGPT</a:t>
+            </a:r>
             <a:r>
               <a:rPr lang="en-AU" sz="2200" dirty="0">
                 <a:highlight>
                   <a:srgbClr val="FFFF00"/>
                 </a:highlight>
               </a:rPr>
-              <a:t>Microsoft</a:t>
-            </a:r>
-            <a:r>
-              <a:rPr lang="en-AU" sz="2200" dirty="0"/>
-              <a:t>, </a:t>
-            </a:r>
-            <a:r>
-              <a:rPr lang="en-AU" sz="2200" dirty="0">
-                <a:highlight>
-                  <a:srgbClr val="FFFF00"/>
-                </a:highlight>
-              </a:rPr>
-              <a:t>Amazon</a:t>
-            </a:r>
-            <a:r>
-              <a:rPr lang="en-AU" sz="2200" dirty="0"/>
-              <a:t>, </a:t>
-            </a:r>
-            <a:r>
-              <a:rPr lang="en-AU" sz="2200" dirty="0">
-                <a:highlight>
-                  <a:srgbClr val="FFFF00"/>
-                </a:highlight>
-              </a:rPr>
-              <a:t>Google</a:t>
-            </a:r>
-            <a:r>
-              <a:rPr lang="en-AU" sz="2200" dirty="0"/>
-              <a:t>, </a:t>
-            </a:r>
-            <a:r>
-              <a:rPr lang="en-AU" sz="2200" dirty="0" err="1"/>
-              <a:t>etc</a:t>
-            </a:r>
-            <a:endParaRPr lang="en-AU" sz="2200" dirty="0"/>
-          </a:p>
-          <a:p>
-            <a:r>
-              <a:rPr lang="en-AU" sz="2600" dirty="0" err="1"/>
-              <a:t>Chatbot</a:t>
-            </a:r>
-            <a:r>
-              <a:rPr lang="en-AU" sz="2600" dirty="0"/>
-              <a:t> / Language Model – </a:t>
-            </a:r>
-          </a:p>
-          <a:p>
-            <a:pPr lvl="1"/>
+              <a:t>, Microsoft </a:t>
+            </a:r>
             <a:r>
               <a:rPr lang="en-AU" sz="2200" dirty="0" err="1">
                 <a:highlight>
@@ -5307,16 +5359,20 @@
               <a:t>OpenAI</a:t>
             </a:r>
             <a:r>
+              <a:rPr lang="en-AU" sz="2200" dirty="0"/>
+              <a:t>, </a:t>
+            </a:r>
+            <a:r>
               <a:rPr lang="en-AU" sz="2200" dirty="0">
                 <a:highlight>
                   <a:srgbClr val="FFFF00"/>
                 </a:highlight>
               </a:rPr>
-              <a:t> GPT3/3.5</a:t>
+              <a:t>Facebook Llama</a:t>
             </a:r>
             <a:r>
               <a:rPr lang="en-AU" sz="2200" dirty="0"/>
-              <a:t>/4/</a:t>
+              <a:t>, Google Bard, Baidu Ernie, </a:t>
             </a:r>
             <a:r>
               <a:rPr lang="en-AU" sz="2200" dirty="0" err="1">
@@ -5324,7 +5380,7 @@
                   <a:srgbClr val="FFFF00"/>
                 </a:highlight>
               </a:rPr>
-              <a:t>ChatGPT</a:t>
+              <a:t>Anthropic’s</a:t>
             </a:r>
             <a:r>
               <a:rPr lang="en-AU" sz="2200" dirty="0">
@@ -5332,26 +5388,6 @@
                   <a:srgbClr val="FFFF00"/>
                 </a:highlight>
               </a:rPr>
-              <a:t>, Microsoft </a:t>
-            </a:r>
-            <a:r>
-              <a:rPr lang="en-AU" sz="2200" dirty="0" err="1">
-                <a:highlight>
-                  <a:srgbClr val="FFFF00"/>
-                </a:highlight>
-              </a:rPr>
-              <a:t>OpenAI</a:t>
-            </a:r>
-            <a:r>
-              <a:rPr lang="en-AU" sz="2200" dirty="0"/>
-              <a:t>, Facebook Llama, Google Bard, Baidu Ernie, </a:t>
-            </a:r>
-            <a:r>
-              <a:rPr lang="en-AU" sz="2200" dirty="0" err="1"/>
-              <a:t>Anthropic’s</a:t>
-            </a:r>
-            <a:r>
-              <a:rPr lang="en-AU" sz="2200" dirty="0"/>
               <a:t> Claude</a:t>
             </a:r>
           </a:p>

</xml_diff>